<commit_message>
add condition on reportExp
</commit_message>
<xml_diff>
--- a/exec/ReportIntroduction.pptx
+++ b/exec/ReportIntroduction.pptx
@@ -5,9 +5,8 @@
     <p:sldMasterId id="2147483648" r:id="rId1"/>
   </p:sldMasterIdLst>
   <p:sldIdLst>
-    <p:sldId id="257" r:id="rId2"/>
-    <p:sldId id="258" r:id="rId3"/>
-    <p:sldId id="259" r:id="rId4"/>
+    <p:sldId id="260" r:id="rId2"/>
+    <p:sldId id="259" r:id="rId3"/>
   </p:sldIdLst>
   <p:sldSz cx="12192000" cy="6858000"/>
   <p:notesSz cx="6858000" cy="9144000"/>
@@ -111,8 +110,7 @@
       <p14:sectionLst xmlns:p14="http://schemas.microsoft.com/office/powerpoint/2010/main">
         <p14:section name="默认节" id="{05BCAA23-1735-404F-B945-27396C38EB51}">
           <p14:sldIdLst>
-            <p14:sldId id="257"/>
-            <p14:sldId id="258"/>
+            <p14:sldId id="260"/>
             <p14:sldId id="259"/>
           </p14:sldIdLst>
         </p14:section>
@@ -3350,44 +3348,294 @@
           <a:chExt cx="0" cy="0"/>
         </a:xfrm>
       </p:grpSpPr>
-      <p:pic>
-        <p:nvPicPr>
-          <p:cNvPr id="5" name="内容占位符 4">
-            <a:extLst>
-              <a:ext uri="{FF2B5EF4-FFF2-40B4-BE49-F238E27FC236}">
-                <a16:creationId xmlns:a16="http://schemas.microsoft.com/office/drawing/2014/main" id="{E3FF6418-6F1F-4E7D-B79D-9C2D40A6CB7A}"/>
-              </a:ext>
-            </a:extLst>
-          </p:cNvPr>
-          <p:cNvPicPr>
-            <a:picLocks noGrp="1" noChangeAspect="1"/>
-          </p:cNvPicPr>
-          <p:nvPr>
-            <p:ph idx="1"/>
-          </p:nvPr>
-        </p:nvPicPr>
-        <p:blipFill rotWithShape="1">
-          <a:blip r:embed="rId2">
-            <a:extLst>
-              <a:ext uri="{28A0092B-C50C-407E-A947-70E740481C1C}">
-                <a14:useLocalDpi xmlns:a14="http://schemas.microsoft.com/office/drawing/2010/main" val="0"/>
-              </a:ext>
-            </a:extLst>
-          </a:blip>
-          <a:srcRect t="2048" r="1476"/>
-          <a:stretch/>
-        </p:blipFill>
+      <p:sp>
+        <p:nvSpPr>
+          <p:cNvPr id="14" name="矩形 13">
+            <a:extLst>
+              <a:ext uri="{FF2B5EF4-FFF2-40B4-BE49-F238E27FC236}">
+                <a16:creationId xmlns:a16="http://schemas.microsoft.com/office/drawing/2014/main" id="{257E1D32-A380-4D7A-A4F6-5A2ACB0EEE6D}"/>
+              </a:ext>
+            </a:extLst>
+          </p:cNvPr>
+          <p:cNvSpPr/>
+          <p:nvPr/>
+        </p:nvSpPr>
         <p:spPr>
           <a:xfrm>
-            <a:off x="1367161" y="120495"/>
-            <a:ext cx="9907480" cy="6737505"/>
+            <a:off x="1207363" y="2121763"/>
+            <a:ext cx="9889724" cy="2814221"/>
           </a:xfrm>
+          <a:prstGeom prst="rect">
+            <a:avLst/>
+          </a:prstGeom>
+          <a:solidFill>
+            <a:schemeClr val="bg1"/>
+          </a:solidFill>
+          <a:ln>
+            <a:noFill/>
+          </a:ln>
         </p:spPr>
-      </p:pic>
+        <p:style>
+          <a:lnRef idx="2">
+            <a:schemeClr val="accent1">
+              <a:shade val="50000"/>
+            </a:schemeClr>
+          </a:lnRef>
+          <a:fillRef idx="1">
+            <a:schemeClr val="accent1"/>
+          </a:fillRef>
+          <a:effectRef idx="0">
+            <a:schemeClr val="accent1"/>
+          </a:effectRef>
+          <a:fontRef idx="minor">
+            <a:schemeClr val="lt1"/>
+          </a:fontRef>
+        </p:style>
+        <p:txBody>
+          <a:bodyPr rtlCol="0" anchor="ctr"/>
+          <a:lstStyle/>
+          <a:p>
+            <a:pPr algn="ctr"/>
+            <a:endParaRPr lang="zh-CN" altLang="en-US"/>
+          </a:p>
+        </p:txBody>
+      </p:sp>
+      <p:sp>
+        <p:nvSpPr>
+          <p:cNvPr id="6" name="文本框 5">
+            <a:extLst>
+              <a:ext uri="{FF2B5EF4-FFF2-40B4-BE49-F238E27FC236}">
+                <a16:creationId xmlns:a16="http://schemas.microsoft.com/office/drawing/2014/main" id="{3A3BA049-84D2-4DBB-AFE2-76D8917CB799}"/>
+              </a:ext>
+            </a:extLst>
+          </p:cNvPr>
+          <p:cNvSpPr txBox="1"/>
+          <p:nvPr/>
+        </p:nvSpPr>
+        <p:spPr>
+          <a:xfrm>
+            <a:off x="4289888" y="2430953"/>
+            <a:ext cx="6372194" cy="1938992"/>
+          </a:xfrm>
+          <a:prstGeom prst="rect">
+            <a:avLst/>
+          </a:prstGeom>
+          <a:noFill/>
+        </p:spPr>
+        <p:txBody>
+          <a:bodyPr wrap="square" rtlCol="0">
+            <a:spAutoFit/>
+          </a:bodyPr>
+          <a:lstStyle/>
+          <a:p>
+            <a:r>
+              <a:rPr lang="zh-CN" altLang="en-US" sz="2000" b="1" dirty="0"/>
+              <a:t>首先您将观看一段</a:t>
+            </a:r>
+            <a:r>
+              <a:rPr lang="en-US" altLang="zh-CN" sz="2000" b="1" dirty="0"/>
+              <a:t>20</a:t>
+            </a:r>
+            <a:r>
+              <a:rPr lang="zh-CN" altLang="en-US" sz="2000" b="1" dirty="0"/>
+              <a:t>秒的视频，其中包含四个运动的小球，请您耐心观看，并在视频结束后回答如下问题：</a:t>
+            </a:r>
+            <a:endParaRPr lang="en-US" altLang="zh-CN" sz="2000" b="1" dirty="0"/>
+          </a:p>
+          <a:p>
+            <a:endParaRPr lang="en-US" altLang="zh-CN" sz="2000" b="1" dirty="0"/>
+          </a:p>
+          <a:p>
+            <a:r>
+              <a:rPr lang="zh-CN" altLang="en-US" sz="2000" b="1" dirty="0"/>
+              <a:t>想象您在课后（食堂或咖啡馆）遇到一个朋友，这位朋友没有看过刚才的视频。您需要对朋友描述刚才的运动。请将您的描述输入到打开的文本文档中</a:t>
+            </a:r>
+            <a:endParaRPr lang="en-US" altLang="zh-CN" sz="2000" b="1" dirty="0"/>
+          </a:p>
+        </p:txBody>
+      </p:sp>
+      <p:grpSp>
+        <p:nvGrpSpPr>
+          <p:cNvPr id="13" name="组合 12">
+            <a:extLst>
+              <a:ext uri="{FF2B5EF4-FFF2-40B4-BE49-F238E27FC236}">
+                <a16:creationId xmlns:a16="http://schemas.microsoft.com/office/drawing/2014/main" id="{7EB4CF76-4367-4C33-A28E-1D7D43FF2787}"/>
+              </a:ext>
+            </a:extLst>
+          </p:cNvPr>
+          <p:cNvGrpSpPr/>
+          <p:nvPr/>
+        </p:nvGrpSpPr>
+        <p:grpSpPr>
+          <a:xfrm>
+            <a:off x="1339347" y="2359147"/>
+            <a:ext cx="2796219" cy="2299503"/>
+            <a:chOff x="1339347" y="2359147"/>
+            <a:chExt cx="2796219" cy="2299503"/>
+          </a:xfrm>
+        </p:grpSpPr>
+        <p:pic>
+          <p:nvPicPr>
+            <p:cNvPr id="8" name="内容占位符 4">
+              <a:extLst>
+                <a:ext uri="{FF2B5EF4-FFF2-40B4-BE49-F238E27FC236}">
+                  <a16:creationId xmlns:a16="http://schemas.microsoft.com/office/drawing/2014/main" id="{1F5EBB20-0286-47A1-8118-6A9F11BF53F4}"/>
+                </a:ext>
+              </a:extLst>
+            </p:cNvPr>
+            <p:cNvPicPr>
+              <a:picLocks noChangeAspect="1"/>
+            </p:cNvPicPr>
+            <p:nvPr/>
+          </p:nvPicPr>
+          <p:blipFill rotWithShape="1">
+            <a:blip r:embed="rId2">
+              <a:extLst>
+                <a:ext uri="{28A0092B-C50C-407E-A947-70E740481C1C}">
+                  <a14:useLocalDpi xmlns:a14="http://schemas.microsoft.com/office/drawing/2010/main" val="0"/>
+                </a:ext>
+              </a:extLst>
+            </a:blip>
+            <a:srcRect t="6673" r="71031"/>
+            <a:stretch/>
+          </p:blipFill>
+          <p:spPr>
+            <a:xfrm>
+              <a:off x="1339347" y="2359147"/>
+              <a:ext cx="2796219" cy="2299503"/>
+            </a:xfrm>
+            <a:prstGeom prst="rect">
+              <a:avLst/>
+            </a:prstGeom>
+          </p:spPr>
+        </p:pic>
+        <p:pic>
+          <p:nvPicPr>
+            <p:cNvPr id="11" name="内容占位符 4">
+              <a:extLst>
+                <a:ext uri="{FF2B5EF4-FFF2-40B4-BE49-F238E27FC236}">
+                  <a16:creationId xmlns:a16="http://schemas.microsoft.com/office/drawing/2014/main" id="{1595A8A4-2692-454E-9E72-87228A9B31A5}"/>
+                </a:ext>
+              </a:extLst>
+            </p:cNvPr>
+            <p:cNvPicPr>
+              <a:picLocks noChangeAspect="1"/>
+            </p:cNvPicPr>
+            <p:nvPr/>
+          </p:nvPicPr>
+          <p:blipFill rotWithShape="1">
+            <a:blip r:embed="rId2">
+              <a:extLst>
+                <a:ext uri="{28A0092B-C50C-407E-A947-70E740481C1C}">
+                  <a14:useLocalDpi xmlns:a14="http://schemas.microsoft.com/office/drawing/2010/main" val="0"/>
+                </a:ext>
+              </a:extLst>
+            </a:blip>
+            <a:srcRect l="16890" t="35051" r="79952" b="38054"/>
+            <a:stretch/>
+          </p:blipFill>
+          <p:spPr>
+            <a:xfrm rot="14471568">
+              <a:off x="2585030" y="3097670"/>
+              <a:ext cx="304855" cy="662657"/>
+            </a:xfrm>
+            <a:prstGeom prst="rect">
+              <a:avLst/>
+            </a:prstGeom>
+          </p:spPr>
+        </p:pic>
+        <p:sp>
+          <p:nvSpPr>
+            <p:cNvPr id="12" name="椭圆 11">
+              <a:extLst>
+                <a:ext uri="{FF2B5EF4-FFF2-40B4-BE49-F238E27FC236}">
+                  <a16:creationId xmlns:a16="http://schemas.microsoft.com/office/drawing/2014/main" id="{0DF50EFA-FA86-448E-95DF-BED602EFFEA2}"/>
+                </a:ext>
+              </a:extLst>
+            </p:cNvPr>
+            <p:cNvSpPr/>
+            <p:nvPr/>
+          </p:nvSpPr>
+          <p:spPr>
+            <a:xfrm>
+              <a:off x="2533269" y="3375684"/>
+              <a:ext cx="185165" cy="185165"/>
+            </a:xfrm>
+            <a:prstGeom prst="ellipse">
+              <a:avLst/>
+            </a:prstGeom>
+            <a:solidFill>
+              <a:srgbClr val="7030A0"/>
+            </a:solidFill>
+            <a:ln>
+              <a:noFill/>
+            </a:ln>
+          </p:spPr>
+          <p:style>
+            <a:lnRef idx="2">
+              <a:schemeClr val="accent1">
+                <a:shade val="50000"/>
+              </a:schemeClr>
+            </a:lnRef>
+            <a:fillRef idx="1">
+              <a:schemeClr val="accent1"/>
+            </a:fillRef>
+            <a:effectRef idx="0">
+              <a:schemeClr val="accent1"/>
+            </a:effectRef>
+            <a:fontRef idx="minor">
+              <a:schemeClr val="lt1"/>
+            </a:fontRef>
+          </p:style>
+          <p:txBody>
+            <a:bodyPr rtlCol="0" anchor="ctr"/>
+            <a:lstStyle/>
+            <a:p>
+              <a:pPr algn="ctr"/>
+              <a:endParaRPr lang="zh-CN" altLang="en-US"/>
+            </a:p>
+          </p:txBody>
+        </p:sp>
+      </p:grpSp>
+      <p:sp>
+        <p:nvSpPr>
+          <p:cNvPr id="15" name="文本框 14">
+            <a:extLst>
+              <a:ext uri="{FF2B5EF4-FFF2-40B4-BE49-F238E27FC236}">
+                <a16:creationId xmlns:a16="http://schemas.microsoft.com/office/drawing/2014/main" id="{A65A1A4B-9390-4A9A-8F90-FB88F6D1B675}"/>
+              </a:ext>
+            </a:extLst>
+          </p:cNvPr>
+          <p:cNvSpPr txBox="1"/>
+          <p:nvPr/>
+        </p:nvSpPr>
+        <p:spPr>
+          <a:xfrm>
+            <a:off x="4307643" y="4487958"/>
+            <a:ext cx="3444536" cy="400110"/>
+          </a:xfrm>
+          <a:prstGeom prst="rect">
+            <a:avLst/>
+          </a:prstGeom>
+          <a:noFill/>
+        </p:spPr>
+        <p:txBody>
+          <a:bodyPr wrap="square" rtlCol="0">
+            <a:spAutoFit/>
+          </a:bodyPr>
+          <a:lstStyle/>
+          <a:p>
+            <a:r>
+              <a:rPr lang="zh-CN" altLang="en-US" sz="2000" b="1" dirty="0"/>
+              <a:t>按空格键开始观看视频</a:t>
+            </a:r>
+          </a:p>
+        </p:txBody>
+      </p:sp>
     </p:spTree>
     <p:extLst>
       <p:ext uri="{BB962C8B-B14F-4D97-AF65-F5344CB8AC3E}">
-        <p14:creationId xmlns:p14="http://schemas.microsoft.com/office/powerpoint/2010/main" val="1563796462"/>
+        <p14:creationId xmlns:p14="http://schemas.microsoft.com/office/powerpoint/2010/main" val="882602913"/>
       </p:ext>
     </p:extLst>
   </p:cSld>
@@ -3416,113 +3664,56 @@
       </p:grpSpPr>
       <p:sp>
         <p:nvSpPr>
-          <p:cNvPr id="2" name="标题 1">
-            <a:extLst>
-              <a:ext uri="{FF2B5EF4-FFF2-40B4-BE49-F238E27FC236}">
-                <a16:creationId xmlns:a16="http://schemas.microsoft.com/office/drawing/2014/main" id="{944073C2-F140-4CA9-94E3-EE480128040C}"/>
-              </a:ext>
-            </a:extLst>
-          </p:cNvPr>
-          <p:cNvSpPr>
-            <a:spLocks noGrp="1"/>
-          </p:cNvSpPr>
-          <p:nvPr>
-            <p:ph type="title"/>
-          </p:nvPr>
-        </p:nvSpPr>
-        <p:spPr/>
-        <p:txBody>
-          <a:bodyPr/>
-          <a:lstStyle/>
-          <a:p>
-            <a:endParaRPr lang="zh-CN" altLang="en-US"/>
-          </a:p>
-        </p:txBody>
-      </p:sp>
-      <p:pic>
-        <p:nvPicPr>
-          <p:cNvPr id="5" name="内容占位符 4">
-            <a:extLst>
-              <a:ext uri="{FF2B5EF4-FFF2-40B4-BE49-F238E27FC236}">
-                <a16:creationId xmlns:a16="http://schemas.microsoft.com/office/drawing/2014/main" id="{9D2AD2CB-6BFA-4B07-92D0-B0FFD6155A06}"/>
-              </a:ext>
-            </a:extLst>
-          </p:cNvPr>
-          <p:cNvPicPr>
-            <a:picLocks noGrp="1" noChangeAspect="1"/>
-          </p:cNvPicPr>
+          <p:cNvPr id="3" name="内容占位符 2">
+            <a:extLst>
+              <a:ext uri="{FF2B5EF4-FFF2-40B4-BE49-F238E27FC236}">
+                <a16:creationId xmlns:a16="http://schemas.microsoft.com/office/drawing/2014/main" id="{36DAF5EA-36CD-435C-874A-910988D7E1D9}"/>
+              </a:ext>
+            </a:extLst>
+          </p:cNvPr>
+          <p:cNvSpPr>
+            <a:spLocks noGrp="1"/>
+          </p:cNvSpPr>
           <p:nvPr>
             <p:ph idx="1"/>
           </p:nvPr>
-        </p:nvPicPr>
-        <p:blipFill rotWithShape="1">
-          <a:blip r:embed="rId2">
-            <a:extLst>
-              <a:ext uri="{28A0092B-C50C-407E-A947-70E740481C1C}">
-                <a14:useLocalDpi xmlns:a14="http://schemas.microsoft.com/office/drawing/2010/main" val="0"/>
-              </a:ext>
-            </a:extLst>
-          </a:blip>
-          <a:srcRect l="-522" t="3040" r="2349" b="-2185"/>
-          <a:stretch/>
-        </p:blipFill>
+        </p:nvSpPr>
         <p:spPr>
           <a:xfrm>
-            <a:off x="1278385" y="12282"/>
-            <a:ext cx="9463596" cy="6845718"/>
+            <a:off x="838200" y="1825624"/>
+            <a:ext cx="10515600" cy="3376691"/>
           </a:xfrm>
+          <a:solidFill>
+            <a:schemeClr val="bg1"/>
+          </a:solidFill>
         </p:spPr>
-      </p:pic>
-    </p:spTree>
-    <p:extLst>
-      <p:ext uri="{BB962C8B-B14F-4D97-AF65-F5344CB8AC3E}">
-        <p14:creationId xmlns:p14="http://schemas.microsoft.com/office/powerpoint/2010/main" val="789881021"/>
-      </p:ext>
-    </p:extLst>
-  </p:cSld>
-  <p:clrMapOvr>
-    <a:masterClrMapping/>
-  </p:clrMapOvr>
-</p:sld>
-</file>
-
-<file path=ppt/slides/slide3.xml><?xml version="1.0" encoding="utf-8"?>
-<p:sld xmlns:a="http://schemas.openxmlformats.org/drawingml/2006/main" xmlns:r="http://schemas.openxmlformats.org/officeDocument/2006/relationships" xmlns:p="http://schemas.openxmlformats.org/presentationml/2006/main">
-  <p:cSld>
-    <p:spTree>
-      <p:nvGrpSpPr>
-        <p:cNvPr id="1" name=""/>
-        <p:cNvGrpSpPr/>
-        <p:nvPr/>
-      </p:nvGrpSpPr>
-      <p:grpSpPr>
-        <a:xfrm>
-          <a:off x="0" y="0"/>
-          <a:ext cx="0" cy="0"/>
-          <a:chOff x="0" y="0"/>
-          <a:chExt cx="0" cy="0"/>
-        </a:xfrm>
-      </p:grpSpPr>
-      <p:sp>
-        <p:nvSpPr>
-          <p:cNvPr id="3" name="内容占位符 2">
-            <a:extLst>
-              <a:ext uri="{FF2B5EF4-FFF2-40B4-BE49-F238E27FC236}">
-                <a16:creationId xmlns:a16="http://schemas.microsoft.com/office/drawing/2014/main" id="{36DAF5EA-36CD-435C-874A-910988D7E1D9}"/>
-              </a:ext>
-            </a:extLst>
-          </p:cNvPr>
-          <p:cNvSpPr>
-            <a:spLocks noGrp="1"/>
-          </p:cNvSpPr>
-          <p:nvPr>
-            <p:ph idx="1"/>
-          </p:nvPr>
-        </p:nvSpPr>
-        <p:spPr/>
-        <p:txBody>
-          <a:bodyPr/>
-          <a:lstStyle/>
+        <p:txBody>
+          <a:bodyPr>
+            <a:normAutofit/>
+          </a:bodyPr>
+          <a:lstStyle/>
+          <a:p>
+            <a:pPr marL="0" indent="0" algn="ctr">
+              <a:buNone/>
+            </a:pPr>
+            <a:endParaRPr lang="en-US" altLang="zh-CN" dirty="0"/>
+          </a:p>
+          <a:p>
+            <a:pPr marL="0" indent="0" algn="ctr">
+              <a:buNone/>
+            </a:pPr>
+            <a:r>
+              <a:rPr lang="zh-CN" altLang="en-US" dirty="0"/>
+              <a:t>视频播放完毕，按空格键打开文本文档</a:t>
+            </a:r>
+            <a:endParaRPr lang="en-US" altLang="zh-CN" dirty="0"/>
+          </a:p>
+          <a:p>
+            <a:pPr marL="0" indent="0" algn="ctr">
+              <a:buNone/>
+            </a:pPr>
+            <a:endParaRPr lang="en-US" altLang="zh-CN" dirty="0"/>
+          </a:p>
           <a:p>
             <a:pPr marL="0" indent="0" algn="ctr">
               <a:buNone/>
@@ -3537,11 +3728,67 @@
             <a:pPr marL="0" indent="0" algn="ctr">
               <a:buNone/>
             </a:pPr>
+            <a:endParaRPr lang="en-US" altLang="zh-CN" dirty="0"/>
+          </a:p>
+          <a:p>
+            <a:pPr marL="0" indent="0" algn="ctr">
+              <a:buNone/>
+            </a:pPr>
             <a:r>
               <a:rPr lang="zh-CN" altLang="en-US" dirty="0"/>
-              <a:t>描述完毕后保存文档并关闭，按空格观看下一组动画</a:t>
+              <a:t>描述完毕后请保存文档并关闭，按空格观看下一组动画</a:t>
             </a:r>
             <a:endParaRPr lang="en-US" altLang="zh-CN" dirty="0"/>
+          </a:p>
+        </p:txBody>
+      </p:sp>
+      <p:sp>
+        <p:nvSpPr>
+          <p:cNvPr id="2" name="矩形 1">
+            <a:extLst>
+              <a:ext uri="{FF2B5EF4-FFF2-40B4-BE49-F238E27FC236}">
+                <a16:creationId xmlns:a16="http://schemas.microsoft.com/office/drawing/2014/main" id="{884BBC85-62CA-4A33-9348-3754E7E95819}"/>
+              </a:ext>
+            </a:extLst>
+          </p:cNvPr>
+          <p:cNvSpPr/>
+          <p:nvPr/>
+        </p:nvSpPr>
+        <p:spPr>
+          <a:xfrm>
+            <a:off x="1447060" y="2246050"/>
+            <a:ext cx="745724" cy="807868"/>
+          </a:xfrm>
+          <a:prstGeom prst="rect">
+            <a:avLst/>
+          </a:prstGeom>
+          <a:noFill/>
+          <a:ln>
+            <a:noFill/>
+          </a:ln>
+        </p:spPr>
+        <p:style>
+          <a:lnRef idx="2">
+            <a:schemeClr val="accent1">
+              <a:shade val="50000"/>
+            </a:schemeClr>
+          </a:lnRef>
+          <a:fillRef idx="1">
+            <a:schemeClr val="accent1"/>
+          </a:fillRef>
+          <a:effectRef idx="0">
+            <a:schemeClr val="accent1"/>
+          </a:effectRef>
+          <a:fontRef idx="minor">
+            <a:schemeClr val="lt1"/>
+          </a:fontRef>
+        </p:style>
+        <p:txBody>
+          <a:bodyPr rtlCol="0" anchor="ctr"/>
+          <a:lstStyle/>
+          <a:p>
+            <a:pPr algn="ctr"/>
+            <a:endParaRPr lang="zh-CN" altLang="en-US"/>
           </a:p>
         </p:txBody>
       </p:sp>

</xml_diff>